<commit_message>
last designs for new-design
</commit_message>
<xml_diff>
--- a/_site/images/overview-types-validation.pptx
+++ b/_site/images/overview-types-validation.pptx
@@ -288,7 +288,7 @@
           <a:p>
             <a:fld id="{A9737C7B-DF08-2D43-8237-A5E0D5557D13}" type="datetimeFigureOut">
               <a:rPr lang="en-US" smtClean="0"/>
-              <a:t>01-12-16</a:t>
+              <a:t>08/12/16</a:t>
             </a:fld>
             <a:endParaRPr lang="en-US"/>
           </a:p>
@@ -458,7 +458,7 @@
           <a:p>
             <a:fld id="{A9737C7B-DF08-2D43-8237-A5E0D5557D13}" type="datetimeFigureOut">
               <a:rPr lang="en-US" smtClean="0"/>
-              <a:t>01-12-16</a:t>
+              <a:t>08/12/16</a:t>
             </a:fld>
             <a:endParaRPr lang="en-US"/>
           </a:p>
@@ -638,7 +638,7 @@
           <a:p>
             <a:fld id="{A9737C7B-DF08-2D43-8237-A5E0D5557D13}" type="datetimeFigureOut">
               <a:rPr lang="en-US" smtClean="0"/>
-              <a:t>01-12-16</a:t>
+              <a:t>08/12/16</a:t>
             </a:fld>
             <a:endParaRPr lang="en-US"/>
           </a:p>
@@ -808,7 +808,7 @@
           <a:p>
             <a:fld id="{A9737C7B-DF08-2D43-8237-A5E0D5557D13}" type="datetimeFigureOut">
               <a:rPr lang="en-US" smtClean="0"/>
-              <a:t>01-12-16</a:t>
+              <a:t>08/12/16</a:t>
             </a:fld>
             <a:endParaRPr lang="en-US"/>
           </a:p>
@@ -1054,7 +1054,7 @@
           <a:p>
             <a:fld id="{A9737C7B-DF08-2D43-8237-A5E0D5557D13}" type="datetimeFigureOut">
               <a:rPr lang="en-US" smtClean="0"/>
-              <a:t>01-12-16</a:t>
+              <a:t>08/12/16</a:t>
             </a:fld>
             <a:endParaRPr lang="en-US"/>
           </a:p>
@@ -1342,7 +1342,7 @@
           <a:p>
             <a:fld id="{A9737C7B-DF08-2D43-8237-A5E0D5557D13}" type="datetimeFigureOut">
               <a:rPr lang="en-US" smtClean="0"/>
-              <a:t>01-12-16</a:t>
+              <a:t>08/12/16</a:t>
             </a:fld>
             <a:endParaRPr lang="en-US"/>
           </a:p>
@@ -1769,7 +1769,7 @@
           <a:p>
             <a:fld id="{A9737C7B-DF08-2D43-8237-A5E0D5557D13}" type="datetimeFigureOut">
               <a:rPr lang="en-US" smtClean="0"/>
-              <a:t>01-12-16</a:t>
+              <a:t>08/12/16</a:t>
             </a:fld>
             <a:endParaRPr lang="en-US"/>
           </a:p>
@@ -1887,7 +1887,7 @@
           <a:p>
             <a:fld id="{A9737C7B-DF08-2D43-8237-A5E0D5557D13}" type="datetimeFigureOut">
               <a:rPr lang="en-US" smtClean="0"/>
-              <a:t>01-12-16</a:t>
+              <a:t>08/12/16</a:t>
             </a:fld>
             <a:endParaRPr lang="en-US"/>
           </a:p>
@@ -1982,7 +1982,7 @@
           <a:p>
             <a:fld id="{A9737C7B-DF08-2D43-8237-A5E0D5557D13}" type="datetimeFigureOut">
               <a:rPr lang="en-US" smtClean="0"/>
-              <a:t>01-12-16</a:t>
+              <a:t>08/12/16</a:t>
             </a:fld>
             <a:endParaRPr lang="en-US"/>
           </a:p>
@@ -2259,7 +2259,7 @@
           <a:p>
             <a:fld id="{A9737C7B-DF08-2D43-8237-A5E0D5557D13}" type="datetimeFigureOut">
               <a:rPr lang="en-US" smtClean="0"/>
-              <a:t>01-12-16</a:t>
+              <a:t>08/12/16</a:t>
             </a:fld>
             <a:endParaRPr lang="en-US"/>
           </a:p>
@@ -2512,7 +2512,7 @@
           <a:p>
             <a:fld id="{A9737C7B-DF08-2D43-8237-A5E0D5557D13}" type="datetimeFigureOut">
               <a:rPr lang="en-US" smtClean="0"/>
-              <a:t>01-12-16</a:t>
+              <a:t>08/12/16</a:t>
             </a:fld>
             <a:endParaRPr lang="en-US"/>
           </a:p>
@@ -2725,7 +2725,7 @@
           <a:p>
             <a:fld id="{A9737C7B-DF08-2D43-8237-A5E0D5557D13}" type="datetimeFigureOut">
               <a:rPr lang="en-US" smtClean="0"/>
-              <a:t>01-12-16</a:t>
+              <a:t>08/12/16</a:t>
             </a:fld>
             <a:endParaRPr lang="en-US"/>
           </a:p>
@@ -3108,8 +3108,8 @@
         </p:nvCxnSpPr>
         <p:spPr>
           <a:xfrm>
-            <a:off x="1605562" y="2037522"/>
-            <a:ext cx="5165336" cy="1"/>
+            <a:off x="750699" y="2037522"/>
+            <a:ext cx="6875063" cy="1"/>
           </a:xfrm>
           <a:prstGeom prst="line">
             <a:avLst/>
@@ -3143,8 +3143,55 @@
           <p:nvPr/>
         </p:nvSpPr>
         <p:spPr>
+          <a:xfrm rot="16200000">
+            <a:off x="634743" y="1979543"/>
+            <a:ext cx="115957" cy="115956"/>
+          </a:xfrm>
+          <a:prstGeom prst="ellipse">
+            <a:avLst/>
+          </a:prstGeom>
+          <a:solidFill>
+            <a:schemeClr val="bg1"/>
+          </a:solidFill>
+          <a:ln w="19050" cmpd="sng">
+            <a:solidFill>
+              <a:srgbClr val="434C53"/>
+            </a:solidFill>
+          </a:ln>
+          <a:effectLst/>
+        </p:spPr>
+        <p:style>
+          <a:lnRef idx="1">
+            <a:schemeClr val="accent1"/>
+          </a:lnRef>
+          <a:fillRef idx="3">
+            <a:schemeClr val="accent1"/>
+          </a:fillRef>
+          <a:effectRef idx="2">
+            <a:schemeClr val="accent1"/>
+          </a:effectRef>
+          <a:fontRef idx="minor">
+            <a:schemeClr val="lt1"/>
+          </a:fontRef>
+        </p:style>
+        <p:txBody>
+          <a:bodyPr rtlCol="0" anchor="ctr"/>
+          <a:lstStyle/>
+          <a:p>
+            <a:pPr algn="ctr"/>
+            <a:endParaRPr lang="en-US"/>
+          </a:p>
+        </p:txBody>
+      </p:sp>
+      <p:sp>
+        <p:nvSpPr>
+          <p:cNvPr id="8" name="Oval 7"/>
+          <p:cNvSpPr/>
+          <p:nvPr/>
+        </p:nvSpPr>
+        <p:spPr>
           <a:xfrm>
-            <a:off x="1482587" y="1979544"/>
+            <a:off x="2852153" y="1979544"/>
             <a:ext cx="115956" cy="115956"/>
           </a:xfrm>
           <a:prstGeom prst="ellipse">
@@ -3185,13 +3232,13 @@
       </p:sp>
       <p:sp>
         <p:nvSpPr>
-          <p:cNvPr id="8" name="Oval 7"/>
+          <p:cNvPr id="9" name="Oval 8"/>
           <p:cNvSpPr/>
           <p:nvPr/>
         </p:nvSpPr>
         <p:spPr>
           <a:xfrm>
-            <a:off x="3230770" y="1979544"/>
+            <a:off x="5352493" y="1979545"/>
             <a:ext cx="115956" cy="115956"/>
           </a:xfrm>
           <a:prstGeom prst="ellipse">
@@ -3232,13 +3279,13 @@
       </p:sp>
       <p:sp>
         <p:nvSpPr>
-          <p:cNvPr id="9" name="Oval 8"/>
+          <p:cNvPr id="10" name="Oval 9"/>
           <p:cNvSpPr/>
           <p:nvPr/>
         </p:nvSpPr>
         <p:spPr>
           <a:xfrm>
-            <a:off x="4992185" y="1979545"/>
+            <a:off x="7567784" y="1978019"/>
             <a:ext cx="115956" cy="115956"/>
           </a:xfrm>
           <a:prstGeom prst="ellipse">
@@ -3279,60 +3326,13 @@
       </p:sp>
       <p:sp>
         <p:nvSpPr>
-          <p:cNvPr id="10" name="Oval 9"/>
-          <p:cNvSpPr/>
-          <p:nvPr/>
-        </p:nvSpPr>
-        <p:spPr>
-          <a:xfrm>
-            <a:off x="6766873" y="1982306"/>
-            <a:ext cx="115956" cy="115956"/>
-          </a:xfrm>
-          <a:prstGeom prst="ellipse">
-            <a:avLst/>
-          </a:prstGeom>
-          <a:solidFill>
-            <a:schemeClr val="bg1"/>
-          </a:solidFill>
-          <a:ln w="19050" cmpd="sng">
-            <a:solidFill>
-              <a:srgbClr val="434C53"/>
-            </a:solidFill>
-          </a:ln>
-          <a:effectLst/>
-        </p:spPr>
-        <p:style>
-          <a:lnRef idx="1">
-            <a:schemeClr val="accent1"/>
-          </a:lnRef>
-          <a:fillRef idx="3">
-            <a:schemeClr val="accent1"/>
-          </a:fillRef>
-          <a:effectRef idx="2">
-            <a:schemeClr val="accent1"/>
-          </a:effectRef>
-          <a:fontRef idx="minor">
-            <a:schemeClr val="lt1"/>
-          </a:fontRef>
-        </p:style>
-        <p:txBody>
-          <a:bodyPr rtlCol="0" anchor="ctr"/>
-          <a:lstStyle/>
-          <a:p>
-            <a:pPr algn="ctr"/>
-            <a:endParaRPr lang="en-US"/>
-          </a:p>
-        </p:txBody>
-      </p:sp>
-      <p:sp>
-        <p:nvSpPr>
           <p:cNvPr id="11" name="TextBox 10"/>
           <p:cNvSpPr txBox="1"/>
           <p:nvPr/>
         </p:nvSpPr>
         <p:spPr>
           <a:xfrm>
-            <a:off x="1089021" y="1490027"/>
+            <a:off x="236052" y="1716474"/>
             <a:ext cx="903087" cy="276999"/>
           </a:xfrm>
           <a:prstGeom prst="rect">
@@ -3374,8 +3374,8 @@
         </p:nvSpPr>
         <p:spPr>
           <a:xfrm>
-            <a:off x="3024943" y="1490027"/>
-            <a:ext cx="518366" cy="276999"/>
+            <a:off x="2648186" y="1724687"/>
+            <a:ext cx="526932" cy="276999"/>
           </a:xfrm>
           <a:prstGeom prst="rect">
             <a:avLst/>
@@ -3388,6 +3388,16 @@
           </a:bodyPr>
           <a:lstStyle/>
           <a:p>
+            <a:r>
+              <a:rPr lang="en-US" sz="1200" dirty="0">
+                <a:solidFill>
+                  <a:srgbClr val="434C53"/>
+                </a:solidFill>
+                <a:latin typeface="Helvetica"/>
+                <a:cs typeface="Helvetica"/>
+              </a:rPr>
+              <a:t>I</a:t>
+            </a:r>
             <a:r>
               <a:rPr lang="en-US" sz="1200" dirty="0" smtClean="0">
                 <a:solidFill>
@@ -3396,7 +3406,7 @@
                 <a:latin typeface="Helvetica"/>
                 <a:cs typeface="Helvetica"/>
               </a:rPr>
-              <a:t>input</a:t>
+              <a:t>nput</a:t>
             </a:r>
             <a:endParaRPr lang="en-US" sz="1200" dirty="0">
               <a:solidFill>
@@ -3416,8 +3426,8 @@
         </p:nvSpPr>
         <p:spPr>
           <a:xfrm>
-            <a:off x="4739976" y="1490027"/>
-            <a:ext cx="612517" cy="276999"/>
+            <a:off x="5086849" y="1723194"/>
+            <a:ext cx="646631" cy="276999"/>
           </a:xfrm>
           <a:prstGeom prst="rect">
             <a:avLst/>
@@ -3430,6 +3440,16 @@
           </a:bodyPr>
           <a:lstStyle/>
           <a:p>
+            <a:r>
+              <a:rPr lang="en-US" sz="1200" dirty="0">
+                <a:solidFill>
+                  <a:srgbClr val="434C53"/>
+                </a:solidFill>
+                <a:latin typeface="Helvetica"/>
+                <a:cs typeface="Helvetica"/>
+              </a:rPr>
+              <a:t>O</a:t>
+            </a:r>
             <a:r>
               <a:rPr lang="en-US" sz="1200" dirty="0" smtClean="0">
                 <a:solidFill>
@@ -3438,7 +3458,7 @@
                 <a:latin typeface="Helvetica"/>
                 <a:cs typeface="Helvetica"/>
               </a:rPr>
-              <a:t>output</a:t>
+              <a:t>utput</a:t>
             </a:r>
             <a:endParaRPr lang="en-US" sz="1200" dirty="0">
               <a:solidFill>
@@ -3458,7 +3478,7 @@
         </p:nvSpPr>
         <p:spPr>
           <a:xfrm>
-            <a:off x="6381873" y="1503927"/>
+            <a:off x="7180022" y="1723194"/>
             <a:ext cx="885955" cy="276999"/>
           </a:xfrm>
           <a:prstGeom prst="rect">
@@ -3500,7 +3520,7 @@
         </p:nvSpPr>
         <p:spPr>
           <a:xfrm>
-            <a:off x="1105587" y="1661251"/>
+            <a:off x="243940" y="2055356"/>
             <a:ext cx="902811" cy="338554"/>
           </a:xfrm>
           <a:prstGeom prst="rect">
@@ -3514,6 +3534,7 @@
           </a:bodyPr>
           <a:lstStyle/>
           <a:p>
+            <a:pPr algn="ctr"/>
             <a:r>
               <a:rPr lang="en-US" sz="800" dirty="0" smtClean="0">
                 <a:solidFill>
@@ -3528,6 +3549,7 @@
             </a:r>
           </a:p>
           <a:p>
+            <a:pPr algn="ctr"/>
             <a:r>
               <a:rPr lang="en-US" sz="800" dirty="0" smtClean="0">
                 <a:solidFill>
@@ -3560,7 +3582,7 @@
         </p:nvSpPr>
         <p:spPr>
           <a:xfrm>
-            <a:off x="3024943" y="1661251"/>
+            <a:off x="2447306" y="2071466"/>
             <a:ext cx="920344" cy="338554"/>
           </a:xfrm>
           <a:prstGeom prst="rect">
@@ -3574,6 +3596,7 @@
           </a:bodyPr>
           <a:lstStyle/>
           <a:p>
+            <a:pPr algn="ctr"/>
             <a:r>
               <a:rPr lang="en-US" sz="800" dirty="0" smtClean="0">
                 <a:solidFill>
@@ -3588,6 +3611,7 @@
             </a:r>
           </a:p>
           <a:p>
+            <a:pPr algn="ctr"/>
             <a:r>
               <a:rPr lang="en-US" sz="800" dirty="0" smtClean="0">
                 <a:solidFill>
@@ -3620,7 +3644,7 @@
         </p:nvSpPr>
         <p:spPr>
           <a:xfrm>
-            <a:off x="4739976" y="1661251"/>
+            <a:off x="4802064" y="2070921"/>
             <a:ext cx="1211289" cy="338554"/>
           </a:xfrm>
           <a:prstGeom prst="rect">
@@ -3634,6 +3658,7 @@
           </a:bodyPr>
           <a:lstStyle/>
           <a:p>
+            <a:pPr algn="ctr"/>
             <a:r>
               <a:rPr lang="en-US" sz="800" dirty="0" smtClean="0">
                 <a:solidFill>
@@ -3648,6 +3673,7 @@
             </a:r>
           </a:p>
           <a:p>
+            <a:pPr algn="ctr"/>
             <a:r>
               <a:rPr lang="en-US" sz="800" dirty="0" smtClean="0">
                 <a:solidFill>
@@ -3680,7 +3706,7 @@
         </p:nvSpPr>
         <p:spPr>
           <a:xfrm>
-            <a:off x="6381873" y="1661251"/>
+            <a:off x="7012528" y="2063032"/>
             <a:ext cx="1226468" cy="215444"/>
           </a:xfrm>
           <a:prstGeom prst="rect">
@@ -3726,8 +3752,8 @@
         </p:nvCxnSpPr>
         <p:spPr>
           <a:xfrm>
-            <a:off x="3079667" y="2278274"/>
-            <a:ext cx="2190607" cy="1"/>
+            <a:off x="2849653" y="2522833"/>
+            <a:ext cx="2650635" cy="1"/>
           </a:xfrm>
           <a:prstGeom prst="line">
             <a:avLst/>
@@ -3763,8 +3789,8 @@
         </p:nvCxnSpPr>
         <p:spPr>
           <a:xfrm>
-            <a:off x="1623216" y="2612900"/>
-            <a:ext cx="5165340" cy="1"/>
+            <a:off x="424599" y="2605011"/>
+            <a:ext cx="7562574" cy="1"/>
           </a:xfrm>
           <a:prstGeom prst="line">
             <a:avLst/>
@@ -3800,8 +3826,8 @@
         </p:nvCxnSpPr>
         <p:spPr>
           <a:xfrm rot="16200000">
-            <a:off x="6534025" y="2371722"/>
-            <a:ext cx="476740" cy="1"/>
+            <a:off x="7841457" y="2452981"/>
+            <a:ext cx="269108" cy="1"/>
           </a:xfrm>
           <a:prstGeom prst="line">
             <a:avLst/>
@@ -3837,8 +3863,8 @@
         </p:nvCxnSpPr>
         <p:spPr>
           <a:xfrm rot="16200000">
-            <a:off x="1384847" y="2366202"/>
-            <a:ext cx="476740" cy="1"/>
+            <a:off x="313932" y="2500754"/>
+            <a:ext cx="202185" cy="1"/>
           </a:xfrm>
           <a:prstGeom prst="line">
             <a:avLst/>
@@ -3874,8 +3900,8 @@
         </p:nvCxnSpPr>
         <p:spPr>
           <a:xfrm rot="16200000">
-            <a:off x="2966794" y="2176543"/>
-            <a:ext cx="222403" cy="1"/>
+            <a:off x="2767543" y="2452658"/>
+            <a:ext cx="151905" cy="1"/>
           </a:xfrm>
           <a:prstGeom prst="line">
             <a:avLst/>
@@ -3911,8 +3937,8 @@
         </p:nvCxnSpPr>
         <p:spPr>
           <a:xfrm rot="16200000">
-            <a:off x="5159072" y="2167073"/>
-            <a:ext cx="222403" cy="1"/>
+            <a:off x="5424335" y="2443188"/>
+            <a:ext cx="151905" cy="1"/>
           </a:xfrm>
           <a:prstGeom prst="line">
             <a:avLst/>
@@ -3940,36 +3966,6 @@
           </a:fontRef>
         </p:style>
       </p:cxnSp>
-      <p:pic>
-        <p:nvPicPr>
-          <p:cNvPr id="30" name="Picture 29" descr="gareth-logo.png"/>
-          <p:cNvPicPr>
-            <a:picLocks noChangeAspect="1"/>
-          </p:cNvPicPr>
-          <p:nvPr/>
-        </p:nvPicPr>
-        <p:blipFill>
-          <a:blip r:embed="rId2">
-            <a:extLst>
-              <a:ext uri="{28A0092B-C50C-407E-A947-70E740481C1C}">
-                <a14:useLocalDpi xmlns:a14="http://schemas.microsoft.com/office/drawing/2010/main" val="0"/>
-              </a:ext>
-            </a:extLst>
-          </a:blip>
-          <a:stretch>
-            <a:fillRect/>
-          </a:stretch>
-        </p:blipFill>
-        <p:spPr>
-          <a:xfrm>
-            <a:off x="7057668" y="2511097"/>
-            <a:ext cx="318489" cy="318489"/>
-          </a:xfrm>
-          <a:prstGeom prst="rect">
-            <a:avLst/>
-          </a:prstGeom>
-        </p:spPr>
-      </p:pic>
       <p:sp>
         <p:nvSpPr>
           <p:cNvPr id="31" name="TextBox 30"/>
@@ -3978,8 +3974,8 @@
         </p:nvSpPr>
         <p:spPr>
           <a:xfrm>
-            <a:off x="3343986" y="2234098"/>
-            <a:ext cx="1758639" cy="276999"/>
+            <a:off x="3525407" y="2253594"/>
+            <a:ext cx="1218352" cy="246221"/>
           </a:xfrm>
           <a:prstGeom prst="rect">
             <a:avLst/>
@@ -3996,16 +3992,26 @@
           <a:lstStyle/>
           <a:p>
             <a:r>
-              <a:rPr lang="en-US" sz="1200" dirty="0" smtClean="0">
+              <a:rPr lang="en-US" sz="1000" dirty="0" smtClean="0">
                 <a:solidFill>
                   <a:schemeClr val="accent1"/>
                 </a:solidFill>
                 <a:latin typeface="Helvetica"/>
                 <a:cs typeface="Helvetica"/>
               </a:rPr>
-              <a:t>Requirement validation</a:t>
-            </a:r>
-            <a:endParaRPr lang="en-US" sz="1200" dirty="0">
+              <a:t>Backlog </a:t>
+            </a:r>
+            <a:r>
+              <a:rPr lang="en-US" sz="1000" dirty="0" smtClean="0">
+                <a:solidFill>
+                  <a:schemeClr val="accent1"/>
+                </a:solidFill>
+                <a:latin typeface="Helvetica"/>
+                <a:cs typeface="Helvetica"/>
+              </a:rPr>
+              <a:t>validation</a:t>
+            </a:r>
+            <a:endParaRPr lang="en-US" sz="1000" dirty="0">
               <a:solidFill>
                 <a:schemeClr val="accent1"/>
               </a:solidFill>
@@ -4023,8 +4029,8 @@
         </p:nvSpPr>
         <p:spPr>
           <a:xfrm>
-            <a:off x="3343986" y="2604573"/>
-            <a:ext cx="1835734" cy="276999"/>
+            <a:off x="3343986" y="2596684"/>
+            <a:ext cx="1560556" cy="246221"/>
           </a:xfrm>
           <a:prstGeom prst="rect">
             <a:avLst/>
@@ -4041,7 +4047,7 @@
           <a:lstStyle/>
           <a:p>
             <a:r>
-              <a:rPr lang="en-US" sz="1200" dirty="0" smtClean="0">
+              <a:rPr lang="en-US" sz="1000" dirty="0" smtClean="0">
                 <a:solidFill>
                   <a:schemeClr val="accent3"/>
                 </a:solidFill>
@@ -4050,7 +4056,7 @@
               </a:rPr>
               <a:t>Business goal validation</a:t>
             </a:r>
-            <a:endParaRPr lang="en-US" sz="1200" dirty="0">
+            <a:endParaRPr lang="en-US" sz="1000" dirty="0">
               <a:solidFill>
                 <a:schemeClr val="accent3"/>
               </a:solidFill>

</xml_diff>